<commit_message>
Last one for now
</commit_message>
<xml_diff>
--- a/docs/ProjectArchitecture.pptx
+++ b/docs/ProjectArchitecture.pptx
@@ -809,7 +809,7 @@
       </p:grpSpPr>
       <p:sp>
         <p:nvSpPr>
-          <p:cNvPr id="57" name="Google Shape;57;g6c5e6cf680_2_0:notes"/>
+          <p:cNvPr id="57" name="Google Shape;57;g75d93095d9_2_4:notes"/>
           <p:cNvSpPr/>
           <p:nvPr>
             <p:ph idx="2" type="sldImg"/>
@@ -844,7 +844,7 @@
       </p:sp>
       <p:sp>
         <p:nvSpPr>
-          <p:cNvPr id="58" name="Google Shape;58;g6c5e6cf680_2_0:notes"/>
+          <p:cNvPr id="58" name="Google Shape;58;g75d93095d9_2_4:notes"/>
           <p:cNvSpPr txBox="1"/>
           <p:nvPr>
             <p:ph idx="1" type="body"/>
@@ -894,7 +894,7 @@
   <p:cSld>
     <p:spTree>
       <p:nvGrpSpPr>
-        <p:cNvPr id="61" name="Shape 61"/>
+        <p:cNvPr id="62" name="Shape 62"/>
         <p:cNvGrpSpPr/>
         <p:nvPr/>
       </p:nvGrpSpPr>
@@ -908,7 +908,7 @@
       </p:grpSpPr>
       <p:sp>
         <p:nvSpPr>
-          <p:cNvPr id="62" name="Google Shape;62;g75d93095d9_2_4:notes"/>
+          <p:cNvPr id="63" name="Google Shape;63;g6c3b7b2bf4_1_0:notes"/>
           <p:cNvSpPr/>
           <p:nvPr>
             <p:ph idx="2" type="sldImg"/>
@@ -943,7 +943,7 @@
       </p:sp>
       <p:sp>
         <p:nvSpPr>
-          <p:cNvPr id="63" name="Google Shape;63;g75d93095d9_2_4:notes"/>
+          <p:cNvPr id="64" name="Google Shape;64;g6c3b7b2bf4_1_0:notes"/>
           <p:cNvSpPr txBox="1"/>
           <p:nvPr>
             <p:ph idx="1" type="body"/>
@@ -993,7 +993,7 @@
   <p:cSld>
     <p:spTree>
       <p:nvGrpSpPr>
-        <p:cNvPr id="67" name="Shape 67"/>
+        <p:cNvPr id="75" name="Shape 75"/>
         <p:cNvGrpSpPr/>
         <p:nvPr/>
       </p:nvGrpSpPr>
@@ -1007,7 +1007,7 @@
       </p:grpSpPr>
       <p:sp>
         <p:nvSpPr>
-          <p:cNvPr id="68" name="Google Shape;68;g6c3b7b2bf4_1_0:notes"/>
+          <p:cNvPr id="76" name="Google Shape;76;g6c3b7b2bf4_1_10:notes"/>
           <p:cNvSpPr/>
           <p:nvPr>
             <p:ph idx="2" type="sldImg"/>
@@ -1042,7 +1042,7 @@
       </p:sp>
       <p:sp>
         <p:nvSpPr>
-          <p:cNvPr id="69" name="Google Shape;69;g6c3b7b2bf4_1_0:notes"/>
+          <p:cNvPr id="77" name="Google Shape;77;g6c3b7b2bf4_1_10:notes"/>
           <p:cNvSpPr txBox="1"/>
           <p:nvPr>
             <p:ph idx="1" type="body"/>
@@ -1092,7 +1092,7 @@
   <p:cSld>
     <p:spTree>
       <p:nvGrpSpPr>
-        <p:cNvPr id="80" name="Shape 80"/>
+        <p:cNvPr id="81" name="Shape 81"/>
         <p:cNvGrpSpPr/>
         <p:nvPr/>
       </p:nvGrpSpPr>
@@ -1106,7 +1106,7 @@
       </p:grpSpPr>
       <p:sp>
         <p:nvSpPr>
-          <p:cNvPr id="81" name="Google Shape;81;g6c3b7b2bf4_1_10:notes"/>
+          <p:cNvPr id="82" name="Google Shape;82;g6c5c73b96d_0_4:notes"/>
           <p:cNvSpPr/>
           <p:nvPr>
             <p:ph idx="2" type="sldImg"/>
@@ -1141,7 +1141,7 @@
       </p:sp>
       <p:sp>
         <p:nvSpPr>
-          <p:cNvPr id="82" name="Google Shape;82;g6c3b7b2bf4_1_10:notes"/>
+          <p:cNvPr id="83" name="Google Shape;83;g6c5c73b96d_0_4:notes"/>
           <p:cNvSpPr txBox="1"/>
           <p:nvPr>
             <p:ph idx="1" type="body"/>
@@ -1191,7 +1191,7 @@
   <p:cSld>
     <p:spTree>
       <p:nvGrpSpPr>
-        <p:cNvPr id="86" name="Shape 86"/>
+        <p:cNvPr id="100" name="Shape 100"/>
         <p:cNvGrpSpPr/>
         <p:nvPr/>
       </p:nvGrpSpPr>
@@ -1205,7 +1205,7 @@
       </p:grpSpPr>
       <p:sp>
         <p:nvSpPr>
-          <p:cNvPr id="87" name="Google Shape;87;g6c5c73b96d_0_4:notes"/>
+          <p:cNvPr id="101" name="Google Shape;101;g6c5e6cf680_2_0:notes"/>
           <p:cNvSpPr/>
           <p:nvPr>
             <p:ph idx="2" type="sldImg"/>
@@ -1240,7 +1240,7 @@
       </p:sp>
       <p:sp>
         <p:nvSpPr>
-          <p:cNvPr id="88" name="Google Shape;88;g6c5c73b96d_0_4:notes"/>
+          <p:cNvPr id="102" name="Google Shape;102;g6c5e6cf680_2_0:notes"/>
           <p:cNvSpPr txBox="1"/>
           <p:nvPr>
             <p:ph idx="1" type="body"/>
@@ -6175,61 +6175,9 @@
           <a:chExt cx="0" cy="0"/>
         </a:xfrm>
       </p:grpSpPr>
-      <p:pic>
-        <p:nvPicPr>
-          <p:cNvPr id="60" name="Google Shape;60;p14"/>
-          <p:cNvPicPr preferRelativeResize="0"/>
-          <p:nvPr/>
-        </p:nvPicPr>
-        <p:blipFill rotWithShape="1">
-          <a:blip r:embed="rId3">
-            <a:alphaModFix/>
-          </a:blip>
-          <a:srcRect b="0" l="626" r="0" t="0"/>
-          <a:stretch/>
-        </p:blipFill>
-        <p:spPr>
-          <a:xfrm>
-            <a:off x="0" y="0"/>
-            <a:ext cx="9144000" cy="5143501"/>
-          </a:xfrm>
-          <a:prstGeom prst="rect">
-            <a:avLst/>
-          </a:prstGeom>
-          <a:noFill/>
-          <a:ln>
-            <a:noFill/>
-          </a:ln>
-        </p:spPr>
-      </p:pic>
-    </p:spTree>
-  </p:cSld>
-  <p:clrMapOvr>
-    <a:masterClrMapping/>
-  </p:clrMapOvr>
-</p:sld>
-</file>
-
-<file path=ppt/slides/slide3.xml><?xml version="1.0" encoding="utf-8"?>
-<p:sld xmlns:a="http://schemas.openxmlformats.org/drawingml/2006/main" xmlns:r="http://schemas.openxmlformats.org/officeDocument/2006/relationships" xmlns:mc="http://schemas.openxmlformats.org/markup-compatibility/2006" xmlns:mv="urn:schemas-microsoft-com:mac:vml" xmlns:p="http://schemas.openxmlformats.org/presentationml/2006/main" xmlns:c="http://schemas.openxmlformats.org/drawingml/2006/chart" xmlns:dgm="http://schemas.openxmlformats.org/drawingml/2006/diagram" xmlns:o="urn:schemas-microsoft-com:office:office" xmlns:v="urn:schemas-microsoft-com:vml" xmlns:pvml="urn:schemas-microsoft-com:office:powerpoint" xmlns:com="http://schemas.openxmlformats.org/drawingml/2006/compatibility" xmlns:p14="http://schemas.microsoft.com/office/powerpoint/2010/main" xmlns:p15="http://schemas.microsoft.com/office/powerpoint/2012/main">
-  <p:cSld>
-    <p:spTree>
-      <p:nvGrpSpPr>
-        <p:cNvPr id="64" name="Shape 64"/>
-        <p:cNvGrpSpPr/>
-        <p:nvPr/>
-      </p:nvGrpSpPr>
-      <p:grpSpPr>
-        <a:xfrm>
-          <a:off x="0" y="0"/>
-          <a:ext cx="0" cy="0"/>
-          <a:chOff x="0" y="0"/>
-          <a:chExt cx="0" cy="0"/>
-        </a:xfrm>
-      </p:grpSpPr>
       <p:sp>
         <p:nvSpPr>
-          <p:cNvPr id="65" name="Google Shape;65;p15"/>
+          <p:cNvPr id="60" name="Google Shape;60;p14"/>
           <p:cNvSpPr txBox="1"/>
           <p:nvPr>
             <p:ph type="title"/>
@@ -6269,7 +6217,7 @@
       </p:sp>
       <p:sp>
         <p:nvSpPr>
-          <p:cNvPr id="66" name="Google Shape;66;p15"/>
+          <p:cNvPr id="61" name="Google Shape;61;p14"/>
           <p:cNvSpPr txBox="1"/>
           <p:nvPr>
             <p:ph idx="1" type="body"/>
@@ -6341,33 +6289,18 @@
             <a:endParaRPr sz="2000"/>
           </a:p>
           <a:p>
-            <a:pPr indent="0" lvl="0" marL="0" rtl="0" algn="l">
-              <a:spcBef>
-                <a:spcPts val="1600"/>
-              </a:spcBef>
-              <a:spcAft>
-                <a:spcPts val="0"/>
-              </a:spcAft>
-              <a:buNone/>
-            </a:pPr>
-            <a:r>
-              <a:t/>
-            </a:r>
-            <a:endParaRPr sz="2000"/>
-          </a:p>
-          <a:p>
-            <a:pPr indent="-342900" lvl="0" marL="457200" rtl="0" algn="l">
-              <a:spcBef>
-                <a:spcPts val="1600"/>
-              </a:spcBef>
-              <a:spcAft>
-                <a:spcPts val="0"/>
-              </a:spcAft>
-              <a:buSzPts val="1800"/>
+            <a:pPr indent="-355600" lvl="0" marL="457200" rtl="0" algn="l">
+              <a:spcBef>
+                <a:spcPts val="0"/>
+              </a:spcBef>
+              <a:spcAft>
+                <a:spcPts val="0"/>
+              </a:spcAft>
+              <a:buSzPts val="2000"/>
               <a:buChar char="●"/>
             </a:pPr>
             <a:r>
-              <a:rPr lang="en"/>
+              <a:rPr lang="en" sz="2000"/>
               <a:t>This goal will be accomplished principly through the use of a GUI and multiple APIs. </a:t>
             </a:r>
             <a:endParaRPr sz="2000"/>
@@ -6382,12 +6315,12 @@
 </p:sld>
 </file>
 
-<file path=ppt/slides/slide4.xml><?xml version="1.0" encoding="utf-8"?>
+<file path=ppt/slides/slide3.xml><?xml version="1.0" encoding="utf-8"?>
 <p:sld xmlns:a="http://schemas.openxmlformats.org/drawingml/2006/main" xmlns:r="http://schemas.openxmlformats.org/officeDocument/2006/relationships" xmlns:mc="http://schemas.openxmlformats.org/markup-compatibility/2006" xmlns:mv="urn:schemas-microsoft-com:mac:vml" xmlns:p="http://schemas.openxmlformats.org/presentationml/2006/main" xmlns:c="http://schemas.openxmlformats.org/drawingml/2006/chart" xmlns:dgm="http://schemas.openxmlformats.org/drawingml/2006/diagram" xmlns:o="urn:schemas-microsoft-com:office:office" xmlns:v="urn:schemas-microsoft-com:vml" xmlns:pvml="urn:schemas-microsoft-com:office:powerpoint" xmlns:com="http://schemas.openxmlformats.org/drawingml/2006/compatibility" xmlns:p14="http://schemas.microsoft.com/office/powerpoint/2010/main" xmlns:p15="http://schemas.microsoft.com/office/powerpoint/2012/main">
   <p:cSld>
     <p:spTree>
       <p:nvGrpSpPr>
-        <p:cNvPr id="70" name="Shape 70"/>
+        <p:cNvPr id="65" name="Shape 65"/>
         <p:cNvGrpSpPr/>
         <p:nvPr/>
       </p:nvGrpSpPr>
@@ -6401,7 +6334,7 @@
       </p:grpSpPr>
       <p:sp>
         <p:nvSpPr>
-          <p:cNvPr id="71" name="Google Shape;71;p16"/>
+          <p:cNvPr id="66" name="Google Shape;66;p15"/>
           <p:cNvSpPr txBox="1"/>
           <p:nvPr>
             <p:ph type="title"/>
@@ -6441,7 +6374,7 @@
       </p:sp>
       <p:sp>
         <p:nvSpPr>
-          <p:cNvPr id="72" name="Google Shape;72;p16"/>
+          <p:cNvPr id="67" name="Google Shape;67;p15"/>
           <p:cNvSpPr txBox="1"/>
           <p:nvPr>
             <p:ph idx="1" type="body"/>
@@ -6533,7 +6466,7 @@
       </p:sp>
       <p:pic>
         <p:nvPicPr>
-          <p:cNvPr id="73" name="Google Shape;73;p16"/>
+          <p:cNvPr id="68" name="Google Shape;68;p15"/>
           <p:cNvPicPr preferRelativeResize="0"/>
           <p:nvPr/>
         </p:nvPicPr>
@@ -6561,7 +6494,7 @@
       </p:pic>
       <p:pic>
         <p:nvPicPr>
-          <p:cNvPr id="74" name="Google Shape;74;p16"/>
+          <p:cNvPr id="69" name="Google Shape;69;p15"/>
           <p:cNvPicPr preferRelativeResize="0"/>
           <p:nvPr/>
         </p:nvPicPr>
@@ -6589,7 +6522,7 @@
       </p:pic>
       <p:pic>
         <p:nvPicPr>
-          <p:cNvPr id="75" name="Google Shape;75;p16"/>
+          <p:cNvPr id="70" name="Google Shape;70;p15"/>
           <p:cNvPicPr preferRelativeResize="0"/>
           <p:nvPr/>
         </p:nvPicPr>
@@ -6617,7 +6550,7 @@
       </p:pic>
       <p:cxnSp>
         <p:nvCxnSpPr>
-          <p:cNvPr id="76" name="Google Shape;76;p16"/>
+          <p:cNvPr id="71" name="Google Shape;71;p15"/>
           <p:cNvCxnSpPr/>
           <p:nvPr/>
         </p:nvCxnSpPr>
@@ -6643,7 +6576,7 @@
       </p:cxnSp>
       <p:cxnSp>
         <p:nvCxnSpPr>
-          <p:cNvPr id="77" name="Google Shape;77;p16"/>
+          <p:cNvPr id="72" name="Google Shape;72;p15"/>
           <p:cNvCxnSpPr/>
           <p:nvPr/>
         </p:nvCxnSpPr>
@@ -6669,7 +6602,7 @@
       </p:cxnSp>
       <p:pic>
         <p:nvPicPr>
-          <p:cNvPr id="78" name="Google Shape;78;p16"/>
+          <p:cNvPr id="73" name="Google Shape;73;p15"/>
           <p:cNvPicPr preferRelativeResize="0"/>
           <p:nvPr/>
         </p:nvPicPr>
@@ -6682,7 +6615,7 @@
         </p:blipFill>
         <p:spPr>
           <a:xfrm>
-            <a:off x="364225" y="2691675"/>
+            <a:off x="586775" y="2707900"/>
             <a:ext cx="1989875" cy="1474650"/>
           </a:xfrm>
           <a:prstGeom prst="rect">
@@ -6696,13 +6629,13 @@
       </p:pic>
       <p:sp>
         <p:nvSpPr>
-          <p:cNvPr id="79" name="Google Shape;79;p16"/>
+          <p:cNvPr id="74" name="Google Shape;74;p15"/>
           <p:cNvSpPr txBox="1"/>
           <p:nvPr/>
         </p:nvSpPr>
         <p:spPr>
           <a:xfrm>
-            <a:off x="435313" y="4166325"/>
+            <a:off x="728938" y="4182550"/>
             <a:ext cx="1847700" cy="222000"/>
           </a:xfrm>
           <a:prstGeom prst="rect">
@@ -6752,12 +6685,12 @@
 </p:sld>
 </file>
 
-<file path=ppt/slides/slide5.xml><?xml version="1.0" encoding="utf-8"?>
+<file path=ppt/slides/slide4.xml><?xml version="1.0" encoding="utf-8"?>
 <p:sld xmlns:a="http://schemas.openxmlformats.org/drawingml/2006/main" xmlns:r="http://schemas.openxmlformats.org/officeDocument/2006/relationships" xmlns:mc="http://schemas.openxmlformats.org/markup-compatibility/2006" xmlns:mv="urn:schemas-microsoft-com:mac:vml" xmlns:p="http://schemas.openxmlformats.org/presentationml/2006/main" xmlns:c="http://schemas.openxmlformats.org/drawingml/2006/chart" xmlns:dgm="http://schemas.openxmlformats.org/drawingml/2006/diagram" xmlns:o="urn:schemas-microsoft-com:office:office" xmlns:v="urn:schemas-microsoft-com:vml" xmlns:pvml="urn:schemas-microsoft-com:office:powerpoint" xmlns:com="http://schemas.openxmlformats.org/drawingml/2006/compatibility" xmlns:p14="http://schemas.microsoft.com/office/powerpoint/2010/main" xmlns:p15="http://schemas.microsoft.com/office/powerpoint/2012/main">
   <p:cSld>
     <p:spTree>
       <p:nvGrpSpPr>
-        <p:cNvPr id="83" name="Shape 83"/>
+        <p:cNvPr id="78" name="Shape 78"/>
         <p:cNvGrpSpPr/>
         <p:nvPr/>
       </p:nvGrpSpPr>
@@ -6771,7 +6704,7 @@
       </p:grpSpPr>
       <p:sp>
         <p:nvSpPr>
-          <p:cNvPr id="84" name="Google Shape;84;p17"/>
+          <p:cNvPr id="79" name="Google Shape;79;p16"/>
           <p:cNvSpPr txBox="1"/>
           <p:nvPr>
             <p:ph type="title"/>
@@ -6811,7 +6744,7 @@
       </p:sp>
       <p:sp>
         <p:nvSpPr>
-          <p:cNvPr id="85" name="Google Shape;85;p17"/>
+          <p:cNvPr id="80" name="Google Shape;80;p16"/>
           <p:cNvSpPr txBox="1"/>
           <p:nvPr>
             <p:ph idx="1" type="body"/>
@@ -6967,12 +6900,12 @@
 </p:sld>
 </file>
 
-<file path=ppt/slides/slide6.xml><?xml version="1.0" encoding="utf-8"?>
+<file path=ppt/slides/slide5.xml><?xml version="1.0" encoding="utf-8"?>
 <p:sld xmlns:a="http://schemas.openxmlformats.org/drawingml/2006/main" xmlns:r="http://schemas.openxmlformats.org/officeDocument/2006/relationships" xmlns:mc="http://schemas.openxmlformats.org/markup-compatibility/2006" xmlns:mv="urn:schemas-microsoft-com:mac:vml" xmlns:p="http://schemas.openxmlformats.org/presentationml/2006/main" xmlns:c="http://schemas.openxmlformats.org/drawingml/2006/chart" xmlns:dgm="http://schemas.openxmlformats.org/drawingml/2006/diagram" xmlns:o="urn:schemas-microsoft-com:office:office" xmlns:v="urn:schemas-microsoft-com:vml" xmlns:pvml="urn:schemas-microsoft-com:office:powerpoint" xmlns:com="http://schemas.openxmlformats.org/drawingml/2006/compatibility" xmlns:p14="http://schemas.microsoft.com/office/powerpoint/2010/main" xmlns:p15="http://schemas.microsoft.com/office/powerpoint/2012/main">
   <p:cSld>
     <p:spTree>
       <p:nvGrpSpPr>
-        <p:cNvPr id="89" name="Shape 89"/>
+        <p:cNvPr id="84" name="Shape 84"/>
         <p:cNvGrpSpPr/>
         <p:nvPr/>
       </p:nvGrpSpPr>
@@ -6986,7 +6919,7 @@
       </p:grpSpPr>
       <p:sp>
         <p:nvSpPr>
-          <p:cNvPr id="90" name="Google Shape;90;p18"/>
+          <p:cNvPr id="85" name="Google Shape;85;p17"/>
           <p:cNvSpPr txBox="1"/>
           <p:nvPr>
             <p:ph type="title"/>
@@ -7026,7 +6959,7 @@
       </p:sp>
       <p:sp>
         <p:nvSpPr>
-          <p:cNvPr id="91" name="Google Shape;91;p18"/>
+          <p:cNvPr id="86" name="Google Shape;86;p17"/>
           <p:cNvSpPr txBox="1"/>
           <p:nvPr/>
         </p:nvSpPr>
@@ -7084,7 +7017,7 @@
       </p:sp>
       <p:sp>
         <p:nvSpPr>
-          <p:cNvPr id="92" name="Google Shape;92;p18"/>
+          <p:cNvPr id="87" name="Google Shape;87;p17"/>
           <p:cNvSpPr txBox="1"/>
           <p:nvPr/>
         </p:nvSpPr>
@@ -7142,7 +7075,7 @@
       </p:sp>
       <p:pic>
         <p:nvPicPr>
-          <p:cNvPr id="93" name="Google Shape;93;p18"/>
+          <p:cNvPr id="88" name="Google Shape;88;p17"/>
           <p:cNvPicPr preferRelativeResize="0"/>
           <p:nvPr/>
         </p:nvPicPr>
@@ -7170,7 +7103,7 @@
       </p:pic>
       <p:pic>
         <p:nvPicPr>
-          <p:cNvPr id="94" name="Google Shape;94;p18"/>
+          <p:cNvPr id="89" name="Google Shape;89;p17"/>
           <p:cNvPicPr preferRelativeResize="0"/>
           <p:nvPr/>
         </p:nvPicPr>
@@ -7198,7 +7131,7 @@
       </p:pic>
       <p:pic>
         <p:nvPicPr>
-          <p:cNvPr id="95" name="Google Shape;95;p18"/>
+          <p:cNvPr id="90" name="Google Shape;90;p17"/>
           <p:cNvPicPr preferRelativeResize="0"/>
           <p:nvPr/>
         </p:nvPicPr>
@@ -7226,7 +7159,7 @@
       </p:pic>
       <p:pic>
         <p:nvPicPr>
-          <p:cNvPr id="96" name="Google Shape;96;p18"/>
+          <p:cNvPr id="91" name="Google Shape;91;p17"/>
           <p:cNvPicPr preferRelativeResize="0"/>
           <p:nvPr/>
         </p:nvPicPr>
@@ -7254,7 +7187,7 @@
       </p:pic>
       <p:sp>
         <p:nvSpPr>
-          <p:cNvPr id="97" name="Google Shape;97;p18"/>
+          <p:cNvPr id="92" name="Google Shape;92;p17"/>
           <p:cNvSpPr txBox="1"/>
           <p:nvPr/>
         </p:nvSpPr>
@@ -7324,7 +7257,7 @@
       </p:sp>
       <p:sp>
         <p:nvSpPr>
-          <p:cNvPr id="98" name="Google Shape;98;p18"/>
+          <p:cNvPr id="93" name="Google Shape;93;p17"/>
           <p:cNvSpPr txBox="1"/>
           <p:nvPr/>
         </p:nvSpPr>
@@ -7382,7 +7315,7 @@
       </p:sp>
       <p:pic>
         <p:nvPicPr>
-          <p:cNvPr id="99" name="Google Shape;99;p18"/>
+          <p:cNvPr id="94" name="Google Shape;94;p17"/>
           <p:cNvPicPr preferRelativeResize="0"/>
           <p:nvPr/>
         </p:nvPicPr>
@@ -7410,7 +7343,7 @@
       </p:pic>
       <p:pic>
         <p:nvPicPr>
-          <p:cNvPr id="100" name="Google Shape;100;p18"/>
+          <p:cNvPr id="95" name="Google Shape;95;p17"/>
           <p:cNvPicPr preferRelativeResize="0"/>
           <p:nvPr/>
         </p:nvPicPr>
@@ -7438,7 +7371,7 @@
       </p:pic>
       <p:sp>
         <p:nvSpPr>
-          <p:cNvPr id="101" name="Google Shape;101;p18"/>
+          <p:cNvPr id="96" name="Google Shape;96;p17"/>
           <p:cNvSpPr txBox="1"/>
           <p:nvPr/>
         </p:nvSpPr>
@@ -7496,7 +7429,7 @@
       </p:sp>
       <p:pic>
         <p:nvPicPr>
-          <p:cNvPr id="102" name="Google Shape;102;p18"/>
+          <p:cNvPr id="97" name="Google Shape;97;p17"/>
           <p:cNvPicPr preferRelativeResize="0"/>
           <p:nvPr/>
         </p:nvPicPr>
@@ -7524,7 +7457,7 @@
       </p:pic>
       <p:pic>
         <p:nvPicPr>
-          <p:cNvPr id="103" name="Google Shape;103;p18"/>
+          <p:cNvPr id="98" name="Google Shape;98;p17"/>
           <p:cNvPicPr preferRelativeResize="0"/>
           <p:nvPr/>
         </p:nvPicPr>
@@ -7551,7 +7484,7 @@
       </p:pic>
       <p:pic>
         <p:nvPicPr>
-          <p:cNvPr id="104" name="Google Shape;104;p18"/>
+          <p:cNvPr id="99" name="Google Shape;99;p17"/>
           <p:cNvPicPr preferRelativeResize="0"/>
           <p:nvPr/>
         </p:nvPicPr>
@@ -7584,7 +7517,338 @@
 </p:sld>
 </file>
 
+<file path=ppt/slides/slide6.xml><?xml version="1.0" encoding="utf-8"?>
+<p:sld xmlns:a="http://schemas.openxmlformats.org/drawingml/2006/main" xmlns:r="http://schemas.openxmlformats.org/officeDocument/2006/relationships" xmlns:mc="http://schemas.openxmlformats.org/markup-compatibility/2006" xmlns:mv="urn:schemas-microsoft-com:mac:vml" xmlns:p="http://schemas.openxmlformats.org/presentationml/2006/main" xmlns:c="http://schemas.openxmlformats.org/drawingml/2006/chart" xmlns:dgm="http://schemas.openxmlformats.org/drawingml/2006/diagram" xmlns:o="urn:schemas-microsoft-com:office:office" xmlns:v="urn:schemas-microsoft-com:vml" xmlns:pvml="urn:schemas-microsoft-com:office:powerpoint" xmlns:com="http://schemas.openxmlformats.org/drawingml/2006/compatibility" xmlns:p14="http://schemas.microsoft.com/office/powerpoint/2010/main" xmlns:p15="http://schemas.microsoft.com/office/powerpoint/2012/main">
+  <p:cSld>
+    <p:spTree>
+      <p:nvGrpSpPr>
+        <p:cNvPr id="103" name="Shape 103"/>
+        <p:cNvGrpSpPr/>
+        <p:nvPr/>
+      </p:nvGrpSpPr>
+      <p:grpSpPr>
+        <a:xfrm>
+          <a:off x="0" y="0"/>
+          <a:ext cx="0" cy="0"/>
+          <a:chOff x="0" y="0"/>
+          <a:chExt cx="0" cy="0"/>
+        </a:xfrm>
+      </p:grpSpPr>
+      <p:pic>
+        <p:nvPicPr>
+          <p:cNvPr id="104" name="Google Shape;104;p18"/>
+          <p:cNvPicPr preferRelativeResize="0"/>
+          <p:nvPr/>
+        </p:nvPicPr>
+        <p:blipFill rotWithShape="1">
+          <a:blip r:embed="rId3">
+            <a:alphaModFix/>
+          </a:blip>
+          <a:srcRect b="0" l="626" r="0" t="0"/>
+          <a:stretch/>
+        </p:blipFill>
+        <p:spPr>
+          <a:xfrm>
+            <a:off x="0" y="0"/>
+            <a:ext cx="9144000" cy="5143501"/>
+          </a:xfrm>
+          <a:prstGeom prst="rect">
+            <a:avLst/>
+          </a:prstGeom>
+          <a:noFill/>
+          <a:ln>
+            <a:noFill/>
+          </a:ln>
+        </p:spPr>
+      </p:pic>
+    </p:spTree>
+  </p:cSld>
+  <p:clrMapOvr>
+    <a:masterClrMapping/>
+  </p:clrMapOvr>
+</p:sld>
+</file>
+
 <file path=ppt/theme/theme1.xml><?xml version="1.0" encoding="utf-8"?>
+<a:theme xmlns:a="http://schemas.openxmlformats.org/drawingml/2006/main" xmlns:r="http://schemas.openxmlformats.org/officeDocument/2006/relationships">
+  <a:themeElements>
+    <a:clrScheme name="Default">
+      <a:dk1>
+        <a:srgbClr val="000000"/>
+      </a:dk1>
+      <a:lt1>
+        <a:srgbClr val="FFFFFF"/>
+      </a:lt1>
+      <a:dk2>
+        <a:srgbClr val="158158"/>
+      </a:dk2>
+      <a:lt2>
+        <a:srgbClr val="F3F3F3"/>
+      </a:lt2>
+      <a:accent1>
+        <a:srgbClr val="058DC7"/>
+      </a:accent1>
+      <a:accent2>
+        <a:srgbClr val="50B432"/>
+      </a:accent2>
+      <a:accent3>
+        <a:srgbClr val="ED561B"/>
+      </a:accent3>
+      <a:accent4>
+        <a:srgbClr val="EDEF00"/>
+      </a:accent4>
+      <a:accent5>
+        <a:srgbClr val="24CBE5"/>
+      </a:accent5>
+      <a:accent6>
+        <a:srgbClr val="64E572"/>
+      </a:accent6>
+      <a:hlink>
+        <a:srgbClr val="2200CC"/>
+      </a:hlink>
+      <a:folHlink>
+        <a:srgbClr val="551A8B"/>
+      </a:folHlink>
+    </a:clrScheme>
+    <a:fontScheme name="Office">
+      <a:majorFont>
+        <a:latin typeface="Arial"/>
+        <a:ea typeface=""/>
+        <a:cs typeface=""/>
+        <a:font script="Jpan" typeface="ＭＳ Ｐゴシック"/>
+        <a:font script="Hang" typeface="맑은 고딕"/>
+        <a:font script="Hans" typeface="宋体"/>
+        <a:font script="Hant" typeface="新細明體"/>
+        <a:font script="Arab" typeface="Times New Roman"/>
+        <a:font script="Hebr" typeface="Times New Roman"/>
+        <a:font script="Thai" typeface="Angsana New"/>
+        <a:font script="Ethi" typeface="Nyala"/>
+        <a:font script="Beng" typeface="Vrinda"/>
+        <a:font script="Gujr" typeface="Shruti"/>
+        <a:font script="Khmr" typeface="MoolBoran"/>
+        <a:font script="Knda" typeface="Tunga"/>
+        <a:font script="Guru" typeface="Raavi"/>
+        <a:font script="Cans" typeface="Euphemia"/>
+        <a:font script="Cher" typeface="Plantagenet Cherokee"/>
+        <a:font script="Yiii" typeface="Microsoft Yi Baiti"/>
+        <a:font script="Tibt" typeface="Microsoft Himalaya"/>
+        <a:font script="Thaa" typeface="MV Boli"/>
+        <a:font script="Deva" typeface="Mangal"/>
+        <a:font script="Telu" typeface="Gautami"/>
+        <a:font script="Taml" typeface="Latha"/>
+        <a:font script="Syrc" typeface="Estrangelo Edessa"/>
+        <a:font script="Orya" typeface="Kalinga"/>
+        <a:font script="Mlym" typeface="Kartika"/>
+        <a:font script="Laoo" typeface="DokChampa"/>
+        <a:font script="Sinh" typeface="Iskoola Pota"/>
+        <a:font script="Mong" typeface="Mongolian Baiti"/>
+        <a:font script="Viet" typeface="Times New Roman"/>
+        <a:font script="Uigh" typeface="Microsoft Uighur"/>
+        <a:font script="Geor" typeface="Sylfaen"/>
+      </a:majorFont>
+      <a:minorFont>
+        <a:latin typeface="Arial"/>
+        <a:ea typeface=""/>
+        <a:cs typeface=""/>
+        <a:font script="Jpan" typeface="ＭＳ Ｐゴシック"/>
+        <a:font script="Hang" typeface="맑은 고딕"/>
+        <a:font script="Hans" typeface="宋体"/>
+        <a:font script="Hant" typeface="新細明體"/>
+        <a:font script="Arab" typeface="Arial"/>
+        <a:font script="Hebr" typeface="Arial"/>
+        <a:font script="Thai" typeface="Cordia New"/>
+        <a:font script="Ethi" typeface="Nyala"/>
+        <a:font script="Beng" typeface="Vrinda"/>
+        <a:font script="Gujr" typeface="Shruti"/>
+        <a:font script="Khmr" typeface="DaunPenh"/>
+        <a:font script="Knda" typeface="Tunga"/>
+        <a:font script="Guru" typeface="Raavi"/>
+        <a:font script="Cans" typeface="Euphemia"/>
+        <a:font script="Cher" typeface="Plantagenet Cherokee"/>
+        <a:font script="Yiii" typeface="Microsoft Yi Baiti"/>
+        <a:font script="Tibt" typeface="Microsoft Himalaya"/>
+        <a:font script="Thaa" typeface="MV Boli"/>
+        <a:font script="Deva" typeface="Mangal"/>
+        <a:font script="Telu" typeface="Gautami"/>
+        <a:font script="Taml" typeface="Latha"/>
+        <a:font script="Syrc" typeface="Estrangelo Edessa"/>
+        <a:font script="Orya" typeface="Kalinga"/>
+        <a:font script="Mlym" typeface="Kartika"/>
+        <a:font script="Laoo" typeface="DokChampa"/>
+        <a:font script="Sinh" typeface="Iskoola Pota"/>
+        <a:font script="Mong" typeface="Mongolian Baiti"/>
+        <a:font script="Viet" typeface="Arial"/>
+        <a:font script="Uigh" typeface="Microsoft Uighur"/>
+        <a:font script="Geor" typeface="Sylfaen"/>
+      </a:minorFont>
+    </a:fontScheme>
+    <a:fmtScheme name="Office">
+      <a:fillStyleLst>
+        <a:solidFill>
+          <a:schemeClr val="phClr"/>
+        </a:solidFill>
+        <a:gradFill rotWithShape="1">
+          <a:gsLst>
+            <a:gs pos="0">
+              <a:schemeClr val="phClr">
+                <a:tint val="50000"/>
+                <a:satMod val="300000"/>
+              </a:schemeClr>
+            </a:gs>
+            <a:gs pos="35000">
+              <a:schemeClr val="phClr">
+                <a:tint val="37000"/>
+                <a:satMod val="300000"/>
+              </a:schemeClr>
+            </a:gs>
+            <a:gs pos="100000">
+              <a:schemeClr val="phClr">
+                <a:tint val="15000"/>
+                <a:satMod val="350000"/>
+              </a:schemeClr>
+            </a:gs>
+          </a:gsLst>
+          <a:lin ang="16200000" scaled="1"/>
+        </a:gradFill>
+        <a:gradFill rotWithShape="1">
+          <a:gsLst>
+            <a:gs pos="0">
+              <a:schemeClr val="phClr">
+                <a:tint val="100000"/>
+                <a:shade val="100000"/>
+                <a:satMod val="130000"/>
+              </a:schemeClr>
+            </a:gs>
+            <a:gs pos="100000">
+              <a:schemeClr val="phClr">
+                <a:tint val="50000"/>
+                <a:shade val="100000"/>
+                <a:satMod val="350000"/>
+              </a:schemeClr>
+            </a:gs>
+          </a:gsLst>
+          <a:lin ang="16200000" scaled="0"/>
+        </a:gradFill>
+      </a:fillStyleLst>
+      <a:lnStyleLst>
+        <a:ln w="9525" cap="flat" cmpd="sng" algn="ctr">
+          <a:solidFill>
+            <a:schemeClr val="phClr">
+              <a:shade val="95000"/>
+              <a:satMod val="105000"/>
+            </a:schemeClr>
+          </a:solidFill>
+          <a:prstDash val="solid"/>
+        </a:ln>
+        <a:ln w="25400" cap="flat" cmpd="sng" algn="ctr">
+          <a:solidFill>
+            <a:schemeClr val="phClr"/>
+          </a:solidFill>
+          <a:prstDash val="solid"/>
+        </a:ln>
+        <a:ln w="38100" cap="flat" cmpd="sng" algn="ctr">
+          <a:solidFill>
+            <a:schemeClr val="phClr"/>
+          </a:solidFill>
+          <a:prstDash val="solid"/>
+        </a:ln>
+      </a:lnStyleLst>
+      <a:effectStyleLst>
+        <a:effectStyle>
+          <a:effectLst>
+            <a:outerShdw blurRad="40000" dist="20000" dir="5400000" rotWithShape="0">
+              <a:srgbClr val="000000">
+                <a:alpha val="38000"/>
+              </a:srgbClr>
+            </a:outerShdw>
+          </a:effectLst>
+        </a:effectStyle>
+        <a:effectStyle>
+          <a:effectLst>
+            <a:outerShdw blurRad="40000" dist="23000" dir="5400000" rotWithShape="0">
+              <a:srgbClr val="000000">
+                <a:alpha val="35000"/>
+              </a:srgbClr>
+            </a:outerShdw>
+          </a:effectLst>
+        </a:effectStyle>
+        <a:effectStyle>
+          <a:effectLst>
+            <a:outerShdw blurRad="40000" dist="23000" dir="5400000" rotWithShape="0">
+              <a:srgbClr val="000000">
+                <a:alpha val="35000"/>
+              </a:srgbClr>
+            </a:outerShdw>
+          </a:effectLst>
+          <a:scene3d>
+            <a:camera prst="orthographicFront">
+              <a:rot lat="0" lon="0" rev="0"/>
+            </a:camera>
+            <a:lightRig rig="threePt" dir="t">
+              <a:rot lat="0" lon="0" rev="1200000"/>
+            </a:lightRig>
+          </a:scene3d>
+          <a:sp3d>
+            <a:bevelT w="63500" h="25400"/>
+          </a:sp3d>
+        </a:effectStyle>
+      </a:effectStyleLst>
+      <a:bgFillStyleLst>
+        <a:solidFill>
+          <a:schemeClr val="phClr"/>
+        </a:solidFill>
+        <a:gradFill rotWithShape="1">
+          <a:gsLst>
+            <a:gs pos="0">
+              <a:schemeClr val="phClr">
+                <a:tint val="40000"/>
+                <a:satMod val="350000"/>
+              </a:schemeClr>
+            </a:gs>
+            <a:gs pos="40000">
+              <a:schemeClr val="phClr">
+                <a:tint val="45000"/>
+                <a:shade val="99000"/>
+                <a:satMod val="350000"/>
+              </a:schemeClr>
+            </a:gs>
+            <a:gs pos="100000">
+              <a:schemeClr val="phClr">
+                <a:shade val="20000"/>
+                <a:satMod val="255000"/>
+              </a:schemeClr>
+            </a:gs>
+          </a:gsLst>
+          <a:path path="circle">
+            <a:fillToRect l="50000" t="-80000" r="50000" b="180000"/>
+          </a:path>
+        </a:gradFill>
+        <a:gradFill rotWithShape="1">
+          <a:gsLst>
+            <a:gs pos="0">
+              <a:schemeClr val="phClr">
+                <a:tint val="80000"/>
+                <a:satMod val="300000"/>
+              </a:schemeClr>
+            </a:gs>
+            <a:gs pos="100000">
+              <a:schemeClr val="phClr">
+                <a:shade val="30000"/>
+                <a:satMod val="200000"/>
+              </a:schemeClr>
+            </a:gs>
+          </a:gsLst>
+          <a:path path="circle">
+            <a:fillToRect l="50000" t="50000" r="50000" b="50000"/>
+          </a:path>
+        </a:gradFill>
+      </a:bgFillStyleLst>
+    </a:fmtScheme>
+  </a:themeElements>
+</a:theme>
+</file>
+
+<file path=ppt/theme/theme2.xml><?xml version="1.0" encoding="utf-8"?>
 <a:theme xmlns:a="http://schemas.openxmlformats.org/drawingml/2006/main" xmlns:r="http://schemas.openxmlformats.org/officeDocument/2006/relationships" name="Simple Dark">
   <a:themeElements>
     <a:clrScheme name="Simple Dark">
@@ -7861,283 +8125,4 @@
     </a:fmtScheme>
   </a:themeElements>
 </a:theme>
-</file>
-
-<file path=ppt/theme/theme2.xml><?xml version="1.0" encoding="utf-8"?>
-<a:theme xmlns:a="http://schemas.openxmlformats.org/drawingml/2006/main" xmlns:r="http://schemas.openxmlformats.org/officeDocument/2006/relationships">
-  <a:themeElements>
-    <a:clrScheme name="Default">
-      <a:dk1>
-        <a:srgbClr val="000000"/>
-      </a:dk1>
-      <a:lt1>
-        <a:srgbClr val="FFFFFF"/>
-      </a:lt1>
-      <a:dk2>
-        <a:srgbClr val="158158"/>
-      </a:dk2>
-      <a:lt2>
-        <a:srgbClr val="F3F3F3"/>
-      </a:lt2>
-      <a:accent1>
-        <a:srgbClr val="058DC7"/>
-      </a:accent1>
-      <a:accent2>
-        <a:srgbClr val="50B432"/>
-      </a:accent2>
-      <a:accent3>
-        <a:srgbClr val="ED561B"/>
-      </a:accent3>
-      <a:accent4>
-        <a:srgbClr val="EDEF00"/>
-      </a:accent4>
-      <a:accent5>
-        <a:srgbClr val="24CBE5"/>
-      </a:accent5>
-      <a:accent6>
-        <a:srgbClr val="64E572"/>
-      </a:accent6>
-      <a:hlink>
-        <a:srgbClr val="2200CC"/>
-      </a:hlink>
-      <a:folHlink>
-        <a:srgbClr val="551A8B"/>
-      </a:folHlink>
-    </a:clrScheme>
-    <a:fontScheme name="Office">
-      <a:majorFont>
-        <a:latin typeface="Arial"/>
-        <a:ea typeface=""/>
-        <a:cs typeface=""/>
-        <a:font script="Jpan" typeface="ＭＳ Ｐゴシック"/>
-        <a:font script="Hang" typeface="맑은 고딕"/>
-        <a:font script="Hans" typeface="宋体"/>
-        <a:font script="Hant" typeface="新細明體"/>
-        <a:font script="Arab" typeface="Times New Roman"/>
-        <a:font script="Hebr" typeface="Times New Roman"/>
-        <a:font script="Thai" typeface="Angsana New"/>
-        <a:font script="Ethi" typeface="Nyala"/>
-        <a:font script="Beng" typeface="Vrinda"/>
-        <a:font script="Gujr" typeface="Shruti"/>
-        <a:font script="Khmr" typeface="MoolBoran"/>
-        <a:font script="Knda" typeface="Tunga"/>
-        <a:font script="Guru" typeface="Raavi"/>
-        <a:font script="Cans" typeface="Euphemia"/>
-        <a:font script="Cher" typeface="Plantagenet Cherokee"/>
-        <a:font script="Yiii" typeface="Microsoft Yi Baiti"/>
-        <a:font script="Tibt" typeface="Microsoft Himalaya"/>
-        <a:font script="Thaa" typeface="MV Boli"/>
-        <a:font script="Deva" typeface="Mangal"/>
-        <a:font script="Telu" typeface="Gautami"/>
-        <a:font script="Taml" typeface="Latha"/>
-        <a:font script="Syrc" typeface="Estrangelo Edessa"/>
-        <a:font script="Orya" typeface="Kalinga"/>
-        <a:font script="Mlym" typeface="Kartika"/>
-        <a:font script="Laoo" typeface="DokChampa"/>
-        <a:font script="Sinh" typeface="Iskoola Pota"/>
-        <a:font script="Mong" typeface="Mongolian Baiti"/>
-        <a:font script="Viet" typeface="Times New Roman"/>
-        <a:font script="Uigh" typeface="Microsoft Uighur"/>
-        <a:font script="Geor" typeface="Sylfaen"/>
-      </a:majorFont>
-      <a:minorFont>
-        <a:latin typeface="Arial"/>
-        <a:ea typeface=""/>
-        <a:cs typeface=""/>
-        <a:font script="Jpan" typeface="ＭＳ Ｐゴシック"/>
-        <a:font script="Hang" typeface="맑은 고딕"/>
-        <a:font script="Hans" typeface="宋体"/>
-        <a:font script="Hant" typeface="新細明體"/>
-        <a:font script="Arab" typeface="Arial"/>
-        <a:font script="Hebr" typeface="Arial"/>
-        <a:font script="Thai" typeface="Cordia New"/>
-        <a:font script="Ethi" typeface="Nyala"/>
-        <a:font script="Beng" typeface="Vrinda"/>
-        <a:font script="Gujr" typeface="Shruti"/>
-        <a:font script="Khmr" typeface="DaunPenh"/>
-        <a:font script="Knda" typeface="Tunga"/>
-        <a:font script="Guru" typeface="Raavi"/>
-        <a:font script="Cans" typeface="Euphemia"/>
-        <a:font script="Cher" typeface="Plantagenet Cherokee"/>
-        <a:font script="Yiii" typeface="Microsoft Yi Baiti"/>
-        <a:font script="Tibt" typeface="Microsoft Himalaya"/>
-        <a:font script="Thaa" typeface="MV Boli"/>
-        <a:font script="Deva" typeface="Mangal"/>
-        <a:font script="Telu" typeface="Gautami"/>
-        <a:font script="Taml" typeface="Latha"/>
-        <a:font script="Syrc" typeface="Estrangelo Edessa"/>
-        <a:font script="Orya" typeface="Kalinga"/>
-        <a:font script="Mlym" typeface="Kartika"/>
-        <a:font script="Laoo" typeface="DokChampa"/>
-        <a:font script="Sinh" typeface="Iskoola Pota"/>
-        <a:font script="Mong" typeface="Mongolian Baiti"/>
-        <a:font script="Viet" typeface="Arial"/>
-        <a:font script="Uigh" typeface="Microsoft Uighur"/>
-        <a:font script="Geor" typeface="Sylfaen"/>
-      </a:minorFont>
-    </a:fontScheme>
-    <a:fmtScheme name="Office">
-      <a:fillStyleLst>
-        <a:solidFill>
-          <a:schemeClr val="phClr"/>
-        </a:solidFill>
-        <a:gradFill rotWithShape="1">
-          <a:gsLst>
-            <a:gs pos="0">
-              <a:schemeClr val="phClr">
-                <a:tint val="50000"/>
-                <a:satMod val="300000"/>
-              </a:schemeClr>
-            </a:gs>
-            <a:gs pos="35000">
-              <a:schemeClr val="phClr">
-                <a:tint val="37000"/>
-                <a:satMod val="300000"/>
-              </a:schemeClr>
-            </a:gs>
-            <a:gs pos="100000">
-              <a:schemeClr val="phClr">
-                <a:tint val="15000"/>
-                <a:satMod val="350000"/>
-              </a:schemeClr>
-            </a:gs>
-          </a:gsLst>
-          <a:lin ang="16200000" scaled="1"/>
-        </a:gradFill>
-        <a:gradFill rotWithShape="1">
-          <a:gsLst>
-            <a:gs pos="0">
-              <a:schemeClr val="phClr">
-                <a:tint val="100000"/>
-                <a:shade val="100000"/>
-                <a:satMod val="130000"/>
-              </a:schemeClr>
-            </a:gs>
-            <a:gs pos="100000">
-              <a:schemeClr val="phClr">
-                <a:tint val="50000"/>
-                <a:shade val="100000"/>
-                <a:satMod val="350000"/>
-              </a:schemeClr>
-            </a:gs>
-          </a:gsLst>
-          <a:lin ang="16200000" scaled="0"/>
-        </a:gradFill>
-      </a:fillStyleLst>
-      <a:lnStyleLst>
-        <a:ln w="9525" cap="flat" cmpd="sng" algn="ctr">
-          <a:solidFill>
-            <a:schemeClr val="phClr">
-              <a:shade val="95000"/>
-              <a:satMod val="105000"/>
-            </a:schemeClr>
-          </a:solidFill>
-          <a:prstDash val="solid"/>
-        </a:ln>
-        <a:ln w="25400" cap="flat" cmpd="sng" algn="ctr">
-          <a:solidFill>
-            <a:schemeClr val="phClr"/>
-          </a:solidFill>
-          <a:prstDash val="solid"/>
-        </a:ln>
-        <a:ln w="38100" cap="flat" cmpd="sng" algn="ctr">
-          <a:solidFill>
-            <a:schemeClr val="phClr"/>
-          </a:solidFill>
-          <a:prstDash val="solid"/>
-        </a:ln>
-      </a:lnStyleLst>
-      <a:effectStyleLst>
-        <a:effectStyle>
-          <a:effectLst>
-            <a:outerShdw blurRad="40000" dist="20000" dir="5400000" rotWithShape="0">
-              <a:srgbClr val="000000">
-                <a:alpha val="38000"/>
-              </a:srgbClr>
-            </a:outerShdw>
-          </a:effectLst>
-        </a:effectStyle>
-        <a:effectStyle>
-          <a:effectLst>
-            <a:outerShdw blurRad="40000" dist="23000" dir="5400000" rotWithShape="0">
-              <a:srgbClr val="000000">
-                <a:alpha val="35000"/>
-              </a:srgbClr>
-            </a:outerShdw>
-          </a:effectLst>
-        </a:effectStyle>
-        <a:effectStyle>
-          <a:effectLst>
-            <a:outerShdw blurRad="40000" dist="23000" dir="5400000" rotWithShape="0">
-              <a:srgbClr val="000000">
-                <a:alpha val="35000"/>
-              </a:srgbClr>
-            </a:outerShdw>
-          </a:effectLst>
-          <a:scene3d>
-            <a:camera prst="orthographicFront">
-              <a:rot lat="0" lon="0" rev="0"/>
-            </a:camera>
-            <a:lightRig rig="threePt" dir="t">
-              <a:rot lat="0" lon="0" rev="1200000"/>
-            </a:lightRig>
-          </a:scene3d>
-          <a:sp3d>
-            <a:bevelT w="63500" h="25400"/>
-          </a:sp3d>
-        </a:effectStyle>
-      </a:effectStyleLst>
-      <a:bgFillStyleLst>
-        <a:solidFill>
-          <a:schemeClr val="phClr"/>
-        </a:solidFill>
-        <a:gradFill rotWithShape="1">
-          <a:gsLst>
-            <a:gs pos="0">
-              <a:schemeClr val="phClr">
-                <a:tint val="40000"/>
-                <a:satMod val="350000"/>
-              </a:schemeClr>
-            </a:gs>
-            <a:gs pos="40000">
-              <a:schemeClr val="phClr">
-                <a:tint val="45000"/>
-                <a:shade val="99000"/>
-                <a:satMod val="350000"/>
-              </a:schemeClr>
-            </a:gs>
-            <a:gs pos="100000">
-              <a:schemeClr val="phClr">
-                <a:shade val="20000"/>
-                <a:satMod val="255000"/>
-              </a:schemeClr>
-            </a:gs>
-          </a:gsLst>
-          <a:path path="circle">
-            <a:fillToRect l="50000" t="-80000" r="50000" b="180000"/>
-          </a:path>
-        </a:gradFill>
-        <a:gradFill rotWithShape="1">
-          <a:gsLst>
-            <a:gs pos="0">
-              <a:schemeClr val="phClr">
-                <a:tint val="80000"/>
-                <a:satMod val="300000"/>
-              </a:schemeClr>
-            </a:gs>
-            <a:gs pos="100000">
-              <a:schemeClr val="phClr">
-                <a:shade val="30000"/>
-                <a:satMod val="200000"/>
-              </a:schemeClr>
-            </a:gs>
-          </a:gsLst>
-          <a:path path="circle">
-            <a:fillToRect l="50000" t="50000" r="50000" b="50000"/>
-          </a:path>
-        </a:gradFill>
-      </a:bgFillStyleLst>
-    </a:fmtScheme>
-  </a:themeElements>
-</a:theme>
 </file>
</xml_diff>